<commit_message>
Added images and editings done to the poster.
</commit_message>
<xml_diff>
--- a/posterDraftLakmarapu.pptx
+++ b/posterDraftLakmarapu.pptx
@@ -1395,7 +1395,7 @@
           <a:p>
             <a:fld id="{E695B7AD-C0E4-4106-98F1-A426950388A1}" type="datetimeFigureOut">
               <a:rPr lang="en-US" smtClean="0"/>
-              <a:t>6/29/2019</a:t>
+              <a:t>7/1/2019</a:t>
             </a:fld>
             <a:endParaRPr lang="en-US"/>
           </a:p>
@@ -1835,7 +1835,7 @@
             </a:r>
             <a:r>
               <a:rPr lang="en-US" dirty="0" smtClean="0"/>
-              <a:t>for the tweets related to Android.</a:t>
+              <a:t>for the tweets related to Android account.</a:t>
             </a:r>
           </a:p>
           <a:p>
@@ -1845,7 +1845,7 @@
             </a:pPr>
             <a:r>
               <a:rPr lang="en-US" dirty="0" smtClean="0"/>
-              <a:t>Finding Compound sentiment analysis for IPhone Users Reply done to Android Tweets.</a:t>
+              <a:t>Finding Compound sentiment analysis for IPhone Users Reply done to Android account Tweets.</a:t>
             </a:r>
             <a:endParaRPr lang="en-US" dirty="0"/>
           </a:p>
@@ -1867,10 +1867,15 @@
             <p:ph type="body" sz="quarter" idx="12"/>
           </p:nvPr>
         </p:nvSpPr>
-        <p:spPr/>
+        <p:spPr>
+          <a:xfrm>
+            <a:off x="32918400" y="7543800"/>
+            <a:ext cx="9954474" cy="19586728"/>
+          </a:xfrm>
+        </p:spPr>
         <p:txBody>
           <a:bodyPr tIns="365760">
-            <a:normAutofit/>
+            <a:normAutofit lnSpcReduction="10000"/>
           </a:bodyPr>
           <a:lstStyle/>
           <a:p>
@@ -1884,11 +1889,7 @@
             </a:r>
             <a:r>
               <a:rPr lang="en-US" sz="7200" dirty="0"/>
-              <a:t> </a:t>
-            </a:r>
-            <a:r>
-              <a:rPr lang="en-US" sz="7200" dirty="0"/>
-              <a:t>A</a:t>
+              <a:t> A</a:t>
             </a:r>
             <a:r>
               <a:rPr lang="en-US" sz="7200" dirty="0" smtClean="0"/>
@@ -1908,15 +1909,7 @@
             </a:r>
             <a:r>
               <a:rPr lang="en-US" sz="7200" dirty="0" smtClean="0"/>
-              <a:t>?</a:t>
-            </a:r>
-            <a:r>
-              <a:rPr lang="en-US" sz="7200" dirty="0" smtClean="0"/>
-              <a:t>” </a:t>
-            </a:r>
-            <a:r>
-              <a:rPr lang="en-US" sz="7200" dirty="0" smtClean="0"/>
-              <a:t>Based on the results I can make some assertions.</a:t>
+              <a:t>?” Based on the results I can make some assertions.</a:t>
             </a:r>
           </a:p>
           <a:p>
@@ -1926,7 +1919,15 @@
             </a:pPr>
             <a:r>
               <a:rPr lang="en-US" sz="7200" dirty="0" smtClean="0"/>
-              <a:t>IPhone users are not so satisfied with the tweets done by the Android.</a:t>
+              <a:t>IPhone </a:t>
+            </a:r>
+            <a:r>
+              <a:rPr lang="en-US" sz="7200" dirty="0"/>
+              <a:t>users are not so positive towards tweets done in Android account </a:t>
+            </a:r>
+            <a:r>
+              <a:rPr lang="en-US" sz="7200" dirty="0" smtClean="0"/>
+              <a:t>which resembles that they are not much satisfied with tweets.</a:t>
             </a:r>
           </a:p>
           <a:p>
@@ -1935,13 +1936,20 @@
               <a:buChar char="•"/>
             </a:pPr>
             <a:r>
+              <a:rPr lang="en-US" sz="7200" dirty="0" smtClean="0"/>
+              <a:t>Approximately 85% of IPhone users are </a:t>
+            </a:r>
+            <a:r>
               <a:rPr lang="en-US" sz="7200" dirty="0"/>
-              <a:t>8</a:t>
+              <a:t>neutral and negative </a:t>
             </a:r>
             <a:r>
               <a:rPr lang="en-US" sz="7200" dirty="0" smtClean="0"/>
-              <a:t>5% of IPhone users are negative and neutral when there is a tweet or event  about Android.</a:t>
-            </a:r>
+              <a:t> when there is a tweet in Android account.</a:t>
+            </a:r>
+          </a:p>
+          <a:p>
+            <a:endParaRPr lang="en-US" sz="7200" dirty="0" smtClean="0"/>
           </a:p>
           <a:p>
             <a:pPr marL="857250" indent="-857250">
@@ -1954,118 +1962,6 @@
       </p:sp>
       <p:sp>
         <p:nvSpPr>
-          <p:cNvPr id="4" name="Text Placeholder 3">
-            <a:extLst>
-              <a:ext uri="{FF2B5EF4-FFF2-40B4-BE49-F238E27FC236}">
-                <a16:creationId xmlns:a16="http://schemas.microsoft.com/office/drawing/2014/main" id="{A459AC47-94BC-470C-9B8A-970292C0ADD6}"/>
-              </a:ext>
-            </a:extLst>
-          </p:cNvPr>
-          <p:cNvSpPr>
-            <a:spLocks noGrp="1"/>
-          </p:cNvSpPr>
-          <p:nvPr>
-            <p:ph type="body" sz="quarter" idx="18"/>
-          </p:nvPr>
-        </p:nvSpPr>
-        <p:spPr>
-          <a:xfrm>
-            <a:off x="11887200" y="7646036"/>
-            <a:ext cx="20116800" cy="19219435"/>
-          </a:xfrm>
-        </p:spPr>
-        <p:txBody>
-          <a:bodyPr>
-            <a:normAutofit/>
-          </a:bodyPr>
-          <a:lstStyle/>
-          <a:p>
-            <a:pPr marL="857250" indent="-857250">
-              <a:buFont typeface="Arial" panose="020B0604020202020204" pitchFamily="34" charset="0"/>
-              <a:buChar char="•"/>
-            </a:pPr>
-            <a:endParaRPr lang="en-US" sz="5400" dirty="0" smtClean="0"/>
-          </a:p>
-          <a:p>
-            <a:pPr marL="857250" indent="-857250">
-              <a:buFont typeface="Arial" panose="020B0604020202020204" pitchFamily="34" charset="0"/>
-              <a:buChar char="•"/>
-            </a:pPr>
-            <a:endParaRPr lang="en-US" sz="5400" dirty="0"/>
-          </a:p>
-          <a:p>
-            <a:pPr marL="857250" indent="-857250">
-              <a:buFont typeface="Arial" panose="020B0604020202020204" pitchFamily="34" charset="0"/>
-              <a:buChar char="•"/>
-            </a:pPr>
-            <a:endParaRPr lang="en-US" sz="5400" dirty="0" smtClean="0"/>
-          </a:p>
-          <a:p>
-            <a:pPr marL="857250" indent="-857250">
-              <a:buFont typeface="Arial" panose="020B0604020202020204" pitchFamily="34" charset="0"/>
-              <a:buChar char="•"/>
-            </a:pPr>
-            <a:endParaRPr lang="en-US" sz="5400" dirty="0"/>
-          </a:p>
-          <a:p>
-            <a:pPr marL="857250" indent="-857250">
-              <a:buFont typeface="Arial" panose="020B0604020202020204" pitchFamily="34" charset="0"/>
-              <a:buChar char="•"/>
-            </a:pPr>
-            <a:endParaRPr lang="en-US" sz="5400" dirty="0" smtClean="0"/>
-          </a:p>
-          <a:p>
-            <a:pPr marL="857250" indent="-857250">
-              <a:buFont typeface="Arial" panose="020B0604020202020204" pitchFamily="34" charset="0"/>
-              <a:buChar char="•"/>
-            </a:pPr>
-            <a:endParaRPr lang="en-US" sz="5400" dirty="0" smtClean="0"/>
-          </a:p>
-          <a:p>
-            <a:endParaRPr lang="en-US" sz="5400" dirty="0"/>
-          </a:p>
-          <a:p>
-            <a:pPr marL="857250" indent="-857250">
-              <a:buFont typeface="Arial" panose="020B0604020202020204" pitchFamily="34" charset="0"/>
-              <a:buChar char="•"/>
-            </a:pPr>
-            <a:endParaRPr lang="en-US" sz="6000" dirty="0" smtClean="0"/>
-          </a:p>
-          <a:p>
-            <a:pPr marL="857250" indent="-857250">
-              <a:buFont typeface="Arial" panose="020B0604020202020204" pitchFamily="34" charset="0"/>
-              <a:buChar char="•"/>
-            </a:pPr>
-            <a:r>
-              <a:rPr lang="en-US" sz="6000" dirty="0" smtClean="0"/>
-              <a:t>Based on the results from this analysis, It is clear that IPhone users are more negative towards the tweets of android.</a:t>
-            </a:r>
-          </a:p>
-          <a:p>
-            <a:pPr marL="857250" indent="-857250">
-              <a:buFont typeface="Arial" panose="020B0604020202020204" pitchFamily="34" charset="0"/>
-              <a:buChar char="•"/>
-            </a:pPr>
-            <a:r>
-              <a:rPr lang="en-US" sz="6000" dirty="0" smtClean="0"/>
-              <a:t>They less agree to the statements done and less satisfied to the tweets of android.</a:t>
-            </a:r>
-          </a:p>
-          <a:p>
-            <a:pPr marL="857250" indent="-857250">
-              <a:buFont typeface="Arial" panose="020B0604020202020204" pitchFamily="34" charset="0"/>
-              <a:buChar char="•"/>
-            </a:pPr>
-            <a:r>
-              <a:rPr lang="en-US" sz="6000" dirty="0" smtClean="0"/>
-              <a:t>Replies from IPhone users where mostly negative and neutral to the tweets.</a:t>
-            </a:r>
-            <a:endParaRPr lang="en-US" sz="6000" dirty="0"/>
-          </a:p>
-        </p:txBody>
-      </p:sp>
-      <p:sp>
-        <p:nvSpPr>
           <p:cNvPr id="5" name="Title 4">
             <a:extLst>
               <a:ext uri="{FF2B5EF4-FFF2-40B4-BE49-F238E27FC236}">
@@ -2087,7 +1983,15 @@
           <a:p>
             <a:r>
               <a:rPr lang="en-US" dirty="0" smtClean="0"/>
-              <a:t>IPhone Users reaction towards Android Tweets</a:t>
+              <a:t>IPhone Users reaction towards </a:t>
+            </a:r>
+            <a:r>
+              <a:rPr lang="en-US" dirty="0" smtClean="0"/>
+              <a:t>Android </a:t>
+            </a:r>
+            <a:r>
+              <a:rPr lang="en-US" dirty="0" smtClean="0"/>
+              <a:t>Tweets</a:t>
             </a:r>
             <a:endParaRPr lang="en-US" dirty="0"/>
           </a:p>
@@ -2197,8 +2101,8 @@
         </p:nvSpPr>
         <p:spPr>
           <a:xfrm>
-            <a:off x="914400" y="29011418"/>
-            <a:ext cx="24765000" cy="2992582"/>
+            <a:off x="914401" y="29479738"/>
+            <a:ext cx="18353314" cy="3171008"/>
           </a:xfrm>
         </p:spPr>
         <p:txBody>
@@ -2214,29 +2118,7 @@
               <a:buFont typeface="Arial" panose="020B0604020202020204" pitchFamily="34" charset="0"/>
               <a:buChar char="•"/>
             </a:pPr>
-            <a:r>
-              <a:rPr lang="en-US" sz="4400" dirty="0" smtClean="0"/>
-              <a:t>API module: </a:t>
-            </a:r>
-            <a:r>
-              <a:rPr lang="en-US" sz="4400" dirty="0" smtClean="0">
-                <a:hlinkClick r:id="rId2"/>
-              </a:rPr>
-              <a:t>http</a:t>
-            </a:r>
-            <a:r>
-              <a:rPr lang="en-US" sz="4400" dirty="0">
-                <a:hlinkClick r:id="rId2"/>
-              </a:rPr>
-              <a:t>://</a:t>
-            </a:r>
-            <a:r>
-              <a:rPr lang="en-US" sz="4400" dirty="0" smtClean="0">
-                <a:hlinkClick r:id="rId2"/>
-              </a:rPr>
-              <a:t>docs.tweepy.org/en/v3.5.0/cursor_tutorial.html</a:t>
-            </a:r>
-            <a:endParaRPr lang="en-US" sz="4400" dirty="0"/>
+            <a:endParaRPr lang="en-US" sz="4400" dirty="0" smtClean="0"/>
           </a:p>
           <a:p>
             <a:pPr marL="571500" indent="-571500">
@@ -2248,16 +2130,62 @@
             </a:pPr>
             <a:r>
               <a:rPr lang="en-US" sz="4400" dirty="0" smtClean="0"/>
-              <a:t>Tweepy documentation</a:t>
-            </a:r>
-            <a:r>
-              <a:rPr lang="en-US" sz="4400" dirty="0"/>
-              <a:t>: http:// bit.ly/</a:t>
-            </a:r>
-            <a:r>
-              <a:rPr lang="en-US" sz="4400" dirty="0" err="1"/>
-              <a:t>tweAPI</a:t>
-            </a:r>
+              <a:t>API module: </a:t>
+            </a:r>
+            <a:r>
+              <a:rPr lang="en-US" sz="4400" dirty="0" smtClean="0">
+                <a:hlinkClick r:id="rId2"/>
+              </a:rPr>
+              <a:t>http</a:t>
+            </a:r>
+            <a:r>
+              <a:rPr lang="en-US" sz="4400" dirty="0">
+                <a:hlinkClick r:id="rId2"/>
+              </a:rPr>
+              <a:t>://</a:t>
+            </a:r>
+            <a:r>
+              <a:rPr lang="en-US" sz="4400" dirty="0" smtClean="0">
+                <a:hlinkClick r:id="rId2"/>
+              </a:rPr>
+              <a:t>docs.tweepy.org/en/v3.5.0/cursor_tutorial.html</a:t>
+            </a:r>
+            <a:endParaRPr lang="en-US" sz="4400" dirty="0"/>
+          </a:p>
+          <a:p>
+            <a:pPr marL="571500" indent="-571500">
+              <a:spcBef>
+                <a:spcPts val="0"/>
+              </a:spcBef>
+              <a:buFont typeface="Arial" panose="020B0604020202020204" pitchFamily="34" charset="0"/>
+              <a:buChar char="•"/>
+            </a:pPr>
+            <a:r>
+              <a:rPr lang="en-US" sz="4400" dirty="0" smtClean="0"/>
+              <a:t>Tweepy documentation: </a:t>
+            </a:r>
+            <a:r>
+              <a:rPr lang="en-US" sz="4400" dirty="0">
+                <a:hlinkClick r:id="rId3"/>
+              </a:rPr>
+              <a:t>http://docs.tweepy.org/en/v3.5.0</a:t>
+            </a:r>
+            <a:r>
+              <a:rPr lang="en-US" sz="4400" dirty="0" smtClean="0">
+                <a:hlinkClick r:id="rId3"/>
+              </a:rPr>
+              <a:t>/</a:t>
+            </a:r>
+            <a:endParaRPr lang="en-US" sz="4400" dirty="0" smtClean="0"/>
+          </a:p>
+          <a:p>
+            <a:pPr marL="571500" indent="-571500">
+              <a:spcBef>
+                <a:spcPts val="0"/>
+              </a:spcBef>
+              <a:buFont typeface="Arial" panose="020B0604020202020204" pitchFamily="34" charset="0"/>
+              <a:buChar char="•"/>
+            </a:pPr>
             <a:endParaRPr lang="en-US" sz="4400" dirty="0"/>
           </a:p>
         </p:txBody>
@@ -2278,7 +2206,12 @@
             <p:ph type="body" sz="quarter" idx="17"/>
           </p:nvPr>
         </p:nvSpPr>
-        <p:spPr/>
+        <p:spPr>
+          <a:xfrm>
+            <a:off x="-195942" y="28212506"/>
+            <a:ext cx="20574000" cy="1143000"/>
+          </a:xfrm>
+        </p:spPr>
         <p:txBody>
           <a:bodyPr/>
           <a:lstStyle/>
@@ -2308,8 +2241,8 @@
         </p:nvSpPr>
         <p:spPr>
           <a:xfrm>
-            <a:off x="27317700" y="29032200"/>
-            <a:ext cx="15659100" cy="3886200"/>
+            <a:off x="22664057" y="29355506"/>
+            <a:ext cx="20312743" cy="3295239"/>
           </a:xfrm>
         </p:spPr>
         <p:txBody>
@@ -2321,7 +2254,7 @@
             <a:pPr algn="ctr"/>
             <a:r>
               <a:rPr lang="en-US" sz="6000" dirty="0">
-                <a:hlinkClick r:id="rId3"/>
+                <a:hlinkClick r:id="rId4"/>
               </a:rPr>
               <a:t>https://github.com/NikithaLakmarapu/posterDraftLakmarapu</a:t>
             </a:r>
@@ -2347,7 +2280,7 @@
         </p:nvSpPr>
         <p:spPr>
           <a:xfrm>
-            <a:off x="29757706" y="27520265"/>
+            <a:off x="27889200" y="28302631"/>
             <a:ext cx="10058400" cy="1143000"/>
           </a:xfrm>
         </p:spPr>
@@ -2646,7 +2579,7 @@
           <p:nvPr/>
         </p:nvPicPr>
         <p:blipFill>
-          <a:blip r:embed="rId4">
+          <a:blip r:embed="rId5">
             <a:extLst>
               <a:ext uri="{28A0092B-C50C-407E-A947-70E740481C1C}">
                 <a14:useLocalDpi xmlns:a14="http://schemas.microsoft.com/office/drawing/2010/main" val="0"/>
@@ -2659,7 +2592,7 @@
         </p:blipFill>
         <p:spPr>
           <a:xfrm>
-            <a:off x="32918400" y="28925548"/>
+            <a:off x="30595906" y="29502410"/>
             <a:ext cx="4644988" cy="1904446"/>
           </a:xfrm>
           <a:prstGeom prst="rect">
@@ -2678,7 +2611,7 @@
           </p:nvPr>
         </p:nvPicPr>
         <p:blipFill>
-          <a:blip r:embed="rId5" cstate="hqprint">
+          <a:blip r:embed="rId6" cstate="hqprint">
             <a:extLst>
               <a:ext uri="{28A0092B-C50C-407E-A947-70E740481C1C}">
                 <a14:useLocalDpi xmlns:a14="http://schemas.microsoft.com/office/drawing/2010/main" val="0"/>
@@ -2709,15 +2642,35 @@
         <p:spPr/>
         <p:txBody>
           <a:bodyPr>
-            <a:normAutofit fontScale="85000" lnSpcReduction="20000"/>
+            <a:noAutofit/>
           </a:bodyPr>
           <a:lstStyle/>
+          <a:p>
+            <a:pPr marL="685800" indent="-685800">
+              <a:buFont typeface="Arial" panose="020B0604020202020204" pitchFamily="34" charset="0"/>
+              <a:buChar char="•"/>
+            </a:pPr>
+            <a:endParaRPr lang="en-US" sz="4800" dirty="0" smtClean="0"/>
+          </a:p>
+          <a:p>
+            <a:pPr marL="685800" indent="-685800">
+              <a:buFont typeface="Arial" panose="020B0604020202020204" pitchFamily="34" charset="0"/>
+              <a:buChar char="•"/>
+            </a:pPr>
+            <a:r>
+              <a:rPr lang="en-US" sz="4800" dirty="0" smtClean="0"/>
+              <a:t>I used Python Tweepy module to grab tweets for Android Account.</a:t>
+            </a:r>
+          </a:p>
           <a:p>
             <a:pPr marL="857250" indent="-857250">
               <a:buFont typeface="Arial" panose="020B0604020202020204" pitchFamily="34" charset="0"/>
               <a:buChar char="•"/>
             </a:pPr>
-            <a:endParaRPr lang="en-US" dirty="0" smtClean="0"/>
+            <a:r>
+              <a:rPr lang="en-US" sz="4800" dirty="0" smtClean="0"/>
+              <a:t>I also used Twitter API for cursor which is used to grab information through redirected pages.</a:t>
+            </a:r>
           </a:p>
           <a:p>
             <a:pPr marL="857250" indent="-857250">
@@ -2725,81 +2678,23 @@
               <a:buChar char="•"/>
             </a:pPr>
             <a:r>
-              <a:rPr lang="en-US" dirty="0" smtClean="0"/>
-              <a:t>I used Python Tweepy module to grab tweets for Android Account.</a:t>
-            </a:r>
-          </a:p>
-          <a:p>
-            <a:pPr marL="857250" indent="-857250">
-              <a:buFont typeface="Arial" panose="020B0604020202020204" pitchFamily="34" charset="0"/>
-              <a:buChar char="•"/>
-            </a:pPr>
-            <a:r>
-              <a:rPr lang="en-US" dirty="0" smtClean="0"/>
-              <a:t>I also used Twitter API for cursor which is used to grab information </a:t>
-            </a:r>
-            <a:r>
-              <a:rPr lang="en-US" sz="5800" dirty="0" smtClean="0"/>
-              <a:t>through</a:t>
-            </a:r>
-            <a:r>
-              <a:rPr lang="en-US" dirty="0" smtClean="0"/>
-              <a:t> redirected pages.</a:t>
-            </a:r>
-          </a:p>
-          <a:p>
-            <a:pPr marL="857250" indent="-857250">
-              <a:buFont typeface="Arial" panose="020B0604020202020204" pitchFamily="34" charset="0"/>
-              <a:buChar char="•"/>
-            </a:pPr>
-            <a:r>
-              <a:rPr lang="en-US" dirty="0" smtClean="0"/>
+              <a:rPr lang="en-US" sz="4800" dirty="0" smtClean="0"/>
               <a:t>I grabbed information from 2 pages which contains about</a:t>
             </a:r>
             <a:r>
-              <a:rPr lang="en-US" dirty="0"/>
+              <a:rPr lang="en-US" sz="4800" dirty="0"/>
               <a:t> </a:t>
             </a:r>
             <a:r>
-              <a:rPr lang="en-US" dirty="0" smtClean="0"/>
-              <a:t>200 replies for tweets of Android.</a:t>
+              <a:rPr lang="en-US" sz="4800" dirty="0" smtClean="0"/>
+              <a:t>200 replies for tweets of Android account.</a:t>
             </a:r>
           </a:p>
         </p:txBody>
       </p:sp>
       <p:pic>
         <p:nvPicPr>
-          <p:cNvPr id="31" name="Picture 30"/>
-          <p:cNvPicPr>
-            <a:picLocks noChangeAspect="1"/>
-          </p:cNvPicPr>
-          <p:nvPr/>
-        </p:nvPicPr>
-        <p:blipFill>
-          <a:blip r:embed="rId6">
-            <a:extLst>
-              <a:ext uri="{28A0092B-C50C-407E-A947-70E740481C1C}">
-                <a14:useLocalDpi xmlns:a14="http://schemas.microsoft.com/office/drawing/2010/main" val="0"/>
-              </a:ext>
-            </a:extLst>
-          </a:blip>
-          <a:stretch>
-            <a:fillRect/>
-          </a:stretch>
-        </p:blipFill>
-        <p:spPr>
-          <a:xfrm>
-            <a:off x="11887200" y="9334501"/>
-            <a:ext cx="8191500" cy="8520362"/>
-          </a:xfrm>
-          <a:prstGeom prst="rect">
-            <a:avLst/>
-          </a:prstGeom>
-        </p:spPr>
-      </p:pic>
-      <p:pic>
-        <p:nvPicPr>
-          <p:cNvPr id="32" name="Picture 31"/>
+          <p:cNvPr id="23" name="Picture 22"/>
           <p:cNvPicPr>
             <a:picLocks noChangeAspect="1"/>
           </p:cNvPicPr>
@@ -2819,8 +2714,182 @@
         </p:blipFill>
         <p:spPr>
           <a:xfrm>
-            <a:off x="20543265" y="9334501"/>
-            <a:ext cx="10965435" cy="8520362"/>
+            <a:off x="10972800" y="17408093"/>
+            <a:ext cx="21687834" cy="13265081"/>
+          </a:xfrm>
+          <a:prstGeom prst="rect">
+            <a:avLst/>
+          </a:prstGeom>
+        </p:spPr>
+      </p:pic>
+      <p:sp>
+        <p:nvSpPr>
+          <p:cNvPr id="28" name="TextBox 27"/>
+          <p:cNvSpPr txBox="1"/>
+          <p:nvPr/>
+        </p:nvSpPr>
+        <p:spPr>
+          <a:xfrm rot="20524532">
+            <a:off x="26620189" y="19598703"/>
+            <a:ext cx="5372100" cy="923330"/>
+          </a:xfrm>
+          <a:prstGeom prst="rect">
+            <a:avLst/>
+          </a:prstGeom>
+          <a:noFill/>
+        </p:spPr>
+        <p:txBody>
+          <a:bodyPr wrap="square" rtlCol="0">
+            <a:spAutoFit/>
+          </a:bodyPr>
+          <a:lstStyle/>
+          <a:p>
+            <a:r>
+              <a:rPr lang="en-US" sz="5400" dirty="0" smtClean="0">
+                <a:solidFill>
+                  <a:schemeClr val="bg1"/>
+                </a:solidFill>
+              </a:rPr>
+              <a:t>Positive</a:t>
+            </a:r>
+            <a:endParaRPr lang="en-US" sz="5400" dirty="0">
+              <a:solidFill>
+                <a:schemeClr val="bg1"/>
+              </a:solidFill>
+            </a:endParaRPr>
+          </a:p>
+        </p:txBody>
+      </p:sp>
+      <p:sp>
+        <p:nvSpPr>
+          <p:cNvPr id="29" name="TextBox 28"/>
+          <p:cNvSpPr txBox="1"/>
+          <p:nvPr/>
+        </p:nvSpPr>
+        <p:spPr>
+          <a:xfrm rot="20777342">
+            <a:off x="27548801" y="23865006"/>
+            <a:ext cx="3969493" cy="923330"/>
+          </a:xfrm>
+          <a:prstGeom prst="rect">
+            <a:avLst/>
+          </a:prstGeom>
+          <a:noFill/>
+        </p:spPr>
+        <p:txBody>
+          <a:bodyPr wrap="square" rtlCol="0">
+            <a:spAutoFit/>
+          </a:bodyPr>
+          <a:lstStyle/>
+          <a:p>
+            <a:r>
+              <a:rPr lang="en-US" sz="5400" dirty="0" smtClean="0">
+                <a:solidFill>
+                  <a:schemeClr val="bg1"/>
+                </a:solidFill>
+              </a:rPr>
+              <a:t>Negative</a:t>
+            </a:r>
+            <a:endParaRPr lang="en-US" sz="5400" dirty="0">
+              <a:solidFill>
+                <a:schemeClr val="bg1"/>
+              </a:solidFill>
+            </a:endParaRPr>
+          </a:p>
+        </p:txBody>
+      </p:sp>
+      <p:sp>
+        <p:nvSpPr>
+          <p:cNvPr id="30" name="TextBox 29"/>
+          <p:cNvSpPr txBox="1"/>
+          <p:nvPr/>
+        </p:nvSpPr>
+        <p:spPr>
+          <a:xfrm rot="451020">
+            <a:off x="13903589" y="23328940"/>
+            <a:ext cx="4575558" cy="923330"/>
+          </a:xfrm>
+          <a:prstGeom prst="rect">
+            <a:avLst/>
+          </a:prstGeom>
+          <a:noFill/>
+        </p:spPr>
+        <p:txBody>
+          <a:bodyPr wrap="square" rtlCol="0">
+            <a:spAutoFit/>
+          </a:bodyPr>
+          <a:lstStyle/>
+          <a:p>
+            <a:r>
+              <a:rPr lang="en-US" sz="5400" dirty="0" smtClean="0">
+                <a:solidFill>
+                  <a:schemeClr val="bg1"/>
+                </a:solidFill>
+              </a:rPr>
+              <a:t>Neutral</a:t>
+            </a:r>
+            <a:endParaRPr lang="en-US" sz="5400" dirty="0">
+              <a:solidFill>
+                <a:schemeClr val="bg1"/>
+              </a:solidFill>
+            </a:endParaRPr>
+          </a:p>
+        </p:txBody>
+      </p:sp>
+      <p:pic>
+        <p:nvPicPr>
+          <p:cNvPr id="33" name="Picture 32"/>
+          <p:cNvPicPr>
+            <a:picLocks noChangeAspect="1"/>
+          </p:cNvPicPr>
+          <p:nvPr/>
+        </p:nvPicPr>
+        <p:blipFill>
+          <a:blip r:embed="rId8">
+            <a:extLst>
+              <a:ext uri="{28A0092B-C50C-407E-A947-70E740481C1C}">
+                <a14:useLocalDpi xmlns:a14="http://schemas.microsoft.com/office/drawing/2010/main" val="0"/>
+              </a:ext>
+            </a:extLst>
+          </a:blip>
+          <a:stretch>
+            <a:fillRect/>
+          </a:stretch>
+        </p:blipFill>
+        <p:spPr>
+          <a:xfrm>
+            <a:off x="21185040" y="7543797"/>
+            <a:ext cx="12621788" cy="10000393"/>
+          </a:xfrm>
+          <a:prstGeom prst="rect">
+            <a:avLst/>
+          </a:prstGeom>
+        </p:spPr>
+      </p:pic>
+      <p:pic>
+        <p:nvPicPr>
+          <p:cNvPr id="34" name="Picture 33"/>
+          <p:cNvPicPr>
+            <a:picLocks noChangeAspect="1"/>
+          </p:cNvPicPr>
+          <p:nvPr/>
+        </p:nvPicPr>
+        <p:blipFill>
+          <a:blip r:embed="rId9">
+            <a:extLst>
+              <a:ext uri="{28A0092B-C50C-407E-A947-70E740481C1C}">
+                <a14:useLocalDpi xmlns:a14="http://schemas.microsoft.com/office/drawing/2010/main" val="0"/>
+              </a:ext>
+            </a:extLst>
+          </a:blip>
+          <a:stretch>
+            <a:fillRect/>
+          </a:stretch>
+        </p:blipFill>
+        <p:spPr>
+          <a:xfrm>
+            <a:off x="10765454" y="7439669"/>
+            <a:ext cx="10851829" cy="10080204"/>
           </a:xfrm>
           <a:prstGeom prst="rect">
             <a:avLst/>
@@ -2837,6 +2906,13 @@
   <p:clrMapOvr>
     <a:masterClrMapping/>
   </p:clrMapOvr>
+  <p:timing>
+    <p:tnLst>
+      <p:par>
+        <p:cTn id="1" dur="indefinite" restart="never" nodeType="tmRoot"/>
+      </p:par>
+    </p:tnLst>
+  </p:timing>
 </p:sld>
 </file>
 

</xml_diff>